<commit_message>
updated adobe deck - about me and fitwatchr versions slides
</commit_message>
<xml_diff>
--- a/Adobe PhoneGap Build course - 6.16.14/Matt Netkow - AGP Guest Speaker - App Design.pptx
+++ b/Adobe PhoneGap Build course - 6.16.14/Matt Netkow - AGP Guest Speaker - App Design.pptx
@@ -6,7 +6,9 @@
   </p:sldMasterIdLst>
   <p:sldIdLst>
     <p:sldId id="256" r:id="rId2"/>
-    <p:sldId id="257" r:id="rId3"/>
+    <p:sldId id="258" r:id="rId3"/>
+    <p:sldId id="257" r:id="rId4"/>
+    <p:sldId id="259" r:id="rId5"/>
   </p:sldIdLst>
   <p:sldSz cx="9144000" cy="6858000" type="screen4x3"/>
   <p:notesSz cx="6858000" cy="9144000"/>
@@ -3350,8 +3352,8 @@
         </p:nvSpPr>
         <p:spPr>
           <a:xfrm>
-            <a:off x="5181600" y="2667000"/>
-            <a:ext cx="3200400" cy="1754326"/>
+            <a:off x="4953000" y="3075709"/>
+            <a:ext cx="4343400" cy="2308324"/>
           </a:xfrm>
           <a:prstGeom prst="rect">
             <a:avLst/>
@@ -3365,55 +3367,137 @@
           <a:lstStyle/>
           <a:p>
             <a:r>
-              <a:rPr lang="en-US" dirty="0" smtClean="0"/>
+              <a:rPr lang="en-US" sz="2400" dirty="0" smtClean="0"/>
               <a:t>Matt </a:t>
             </a:r>
             <a:r>
-              <a:rPr lang="en-US" dirty="0" err="1" smtClean="0"/>
+              <a:rPr lang="en-US" sz="2400" dirty="0" err="1" smtClean="0"/>
               <a:t>Netkow</a:t>
             </a:r>
-            <a:endParaRPr lang="en-US" dirty="0" smtClean="0"/>
-          </a:p>
-          <a:p>
-            <a:r>
-              <a:rPr lang="en-US" dirty="0" smtClean="0"/>
+            <a:endParaRPr lang="en-US" sz="2400" dirty="0" smtClean="0"/>
+          </a:p>
+          <a:p>
+            <a:r>
+              <a:rPr lang="en-US" sz="2400" dirty="0" smtClean="0"/>
               <a:t>Developer/Founder, </a:t>
             </a:r>
             <a:r>
-              <a:rPr lang="en-US" dirty="0" err="1" smtClean="0"/>
+              <a:rPr lang="en-US" sz="2400" dirty="0" err="1" smtClean="0"/>
               <a:t>Netkosoft</a:t>
             </a:r>
-            <a:endParaRPr lang="en-US" dirty="0" smtClean="0"/>
-          </a:p>
-          <a:p>
-            <a:endParaRPr lang="en-US" dirty="0"/>
-          </a:p>
-          <a:p>
-            <a:r>
-              <a:rPr lang="en-US" dirty="0" smtClean="0"/>
+            <a:endParaRPr lang="en-US" sz="2400" dirty="0" smtClean="0"/>
+          </a:p>
+          <a:p>
+            <a:endParaRPr lang="en-US" sz="2400" dirty="0"/>
+          </a:p>
+          <a:p>
+            <a:r>
+              <a:rPr lang="en-US" sz="2400" dirty="0" smtClean="0"/>
               <a:t>www.netkow.com</a:t>
             </a:r>
           </a:p>
           <a:p>
             <a:r>
-              <a:rPr lang="en-US" dirty="0" smtClean="0"/>
+              <a:rPr lang="en-US" sz="2400" dirty="0" smtClean="0"/>
               <a:t>@</a:t>
             </a:r>
             <a:r>
-              <a:rPr lang="en-US" dirty="0" err="1" smtClean="0"/>
+              <a:rPr lang="en-US" sz="2400" dirty="0" err="1" smtClean="0"/>
               <a:t>dotNetkow</a:t>
             </a:r>
-            <a:endParaRPr lang="en-US" dirty="0" smtClean="0"/>
-          </a:p>
-          <a:p>
-            <a:r>
-              <a:rPr lang="en-US" dirty="0" smtClean="0"/>
+            <a:endParaRPr lang="en-US" sz="2400" dirty="0" smtClean="0"/>
+          </a:p>
+          <a:p>
+            <a:r>
+              <a:rPr lang="en-US" sz="2400" dirty="0" smtClean="0"/>
               <a:t>matt.netkow@gmail.com</a:t>
             </a:r>
-            <a:endParaRPr lang="en-US" dirty="0"/>
-          </a:p>
-        </p:txBody>
-      </p:sp>
+            <a:endParaRPr lang="en-US" sz="2400" dirty="0"/>
+          </a:p>
+        </p:txBody>
+      </p:sp>
+      <p:pic>
+        <p:nvPicPr>
+          <p:cNvPr id="1026" name="Picture 2" descr="Matthew Netkow"/>
+          <p:cNvPicPr>
+            <a:picLocks noChangeAspect="1" noChangeArrowheads="1"/>
+          </p:cNvPicPr>
+          <p:nvPr/>
+        </p:nvPicPr>
+        <p:blipFill>
+          <a:blip r:embed="rId2">
+            <a:extLst>
+              <a:ext uri="{28A0092B-C50C-407E-A947-70E740481C1C}">
+                <a14:useLocalDpi xmlns:a14="http://schemas.microsoft.com/office/drawing/2010/main" val="0"/>
+              </a:ext>
+            </a:extLst>
+          </a:blip>
+          <a:srcRect/>
+          <a:stretch>
+            <a:fillRect/>
+          </a:stretch>
+        </p:blipFill>
+        <p:spPr bwMode="auto">
+          <a:xfrm>
+            <a:off x="2514600" y="3113809"/>
+            <a:ext cx="2296391" cy="2296391"/>
+          </a:xfrm>
+          <a:prstGeom prst="rect">
+            <a:avLst/>
+          </a:prstGeom>
+          <a:noFill/>
+          <a:extLst>
+            <a:ext uri="{909E8E84-426E-40DD-AFC4-6F175D3DCCD1}">
+              <a14:hiddenFill xmlns:a14="http://schemas.microsoft.com/office/drawing/2010/main">
+                <a:solidFill>
+                  <a:srgbClr val="FFFFFF"/>
+                </a:solidFill>
+              </a14:hiddenFill>
+            </a:ext>
+          </a:extLst>
+        </p:spPr>
+      </p:pic>
+      <p:pic>
+        <p:nvPicPr>
+          <p:cNvPr id="1027" name="Picture 3" descr="C:\sourcecode\fitwatcher\fitwatcher\Fitwatcher\icon.png"/>
+          <p:cNvPicPr>
+            <a:picLocks noChangeAspect="1" noChangeArrowheads="1"/>
+          </p:cNvPicPr>
+          <p:nvPr/>
+        </p:nvPicPr>
+        <p:blipFill>
+          <a:blip r:embed="rId3">
+            <a:extLst>
+              <a:ext uri="{28A0092B-C50C-407E-A947-70E740481C1C}">
+                <a14:useLocalDpi xmlns:a14="http://schemas.microsoft.com/office/drawing/2010/main" val="0"/>
+              </a:ext>
+            </a:extLst>
+          </a:blip>
+          <a:srcRect/>
+          <a:stretch>
+            <a:fillRect/>
+          </a:stretch>
+        </p:blipFill>
+        <p:spPr bwMode="auto">
+          <a:xfrm>
+            <a:off x="152400" y="3124200"/>
+            <a:ext cx="2224606" cy="2224606"/>
+          </a:xfrm>
+          <a:prstGeom prst="rect">
+            <a:avLst/>
+          </a:prstGeom>
+          <a:noFill/>
+          <a:extLst>
+            <a:ext uri="{909E8E84-426E-40DD-AFC4-6F175D3DCCD1}">
+              <a14:hiddenFill xmlns:a14="http://schemas.microsoft.com/office/drawing/2010/main">
+                <a:solidFill>
+                  <a:srgbClr val="FFFFFF"/>
+                </a:solidFill>
+              </a14:hiddenFill>
+            </a:ext>
+          </a:extLst>
+        </p:spPr>
+      </p:pic>
     </p:spTree>
     <p:extLst>
       <p:ext uri="{BB962C8B-B14F-4D97-AF65-F5344CB8AC3E}">
@@ -3424,6 +3508,13 @@
   <p:clrMapOvr>
     <a:masterClrMapping/>
   </p:clrMapOvr>
+  <p:timing>
+    <p:tnLst>
+      <p:par>
+        <p:cTn id="1" dur="indefinite" restart="never" nodeType="tmRoot"/>
+      </p:par>
+    </p:tnLst>
+  </p:timing>
 </p:sld>
 </file>
 
@@ -3446,17 +3537,288 @@
       </p:grpSpPr>
       <p:sp>
         <p:nvSpPr>
-          <p:cNvPr id="2" name="Content Placeholder 1"/>
-          <p:cNvSpPr>
-            <a:spLocks noGrp="1"/>
-          </p:cNvSpPr>
-          <p:nvPr>
-            <p:ph sz="quarter" idx="13"/>
-          </p:nvPr>
-        </p:nvSpPr>
-        <p:spPr/>
-        <p:txBody>
-          <a:bodyPr/>
+          <p:cNvPr id="3" name="Title 2"/>
+          <p:cNvSpPr>
+            <a:spLocks noGrp="1"/>
+          </p:cNvSpPr>
+          <p:nvPr>
+            <p:ph type="title"/>
+          </p:nvPr>
+        </p:nvSpPr>
+        <p:spPr>
+          <a:xfrm>
+            <a:off x="3429000" y="152400"/>
+            <a:ext cx="2073348" cy="609600"/>
+          </a:xfrm>
+        </p:spPr>
+        <p:txBody>
+          <a:bodyPr/>
+          <a:lstStyle/>
+          <a:p>
+            <a:pPr algn="ctr"/>
+            <a:r>
+              <a:rPr lang="en-US" dirty="0" smtClean="0"/>
+              <a:t>About me</a:t>
+            </a:r>
+            <a:endParaRPr lang="en-US" dirty="0"/>
+          </a:p>
+        </p:txBody>
+      </p:sp>
+      <p:sp>
+        <p:nvSpPr>
+          <p:cNvPr id="4" name="TextBox 3"/>
+          <p:cNvSpPr txBox="1"/>
+          <p:nvPr/>
+        </p:nvSpPr>
+        <p:spPr>
+          <a:xfrm>
+            <a:off x="457200" y="1143000"/>
+            <a:ext cx="7924800" cy="2092881"/>
+          </a:xfrm>
+          <a:prstGeom prst="rect">
+            <a:avLst/>
+          </a:prstGeom>
+          <a:noFill/>
+        </p:spPr>
+        <p:txBody>
+          <a:bodyPr wrap="square" rtlCol="0">
+            <a:spAutoFit/>
+          </a:bodyPr>
+          <a:lstStyle/>
+          <a:p>
+            <a:pPr marL="285750" indent="-285750">
+              <a:buFont typeface="Arial" panose="020B0604020202020204" pitchFamily="34" charset="0"/>
+              <a:buChar char="•"/>
+            </a:pPr>
+            <a:r>
+              <a:rPr lang="en-US" sz="2600" dirty="0" smtClean="0"/>
+              <a:t>Senior Developer for The SAVO Group – 5 years</a:t>
+            </a:r>
+          </a:p>
+          <a:p>
+            <a:pPr marL="742950" lvl="1" indent="-285750">
+              <a:buFont typeface="Arial" panose="020B0604020202020204" pitchFamily="34" charset="0"/>
+              <a:buChar char="•"/>
+            </a:pPr>
+            <a:r>
+              <a:rPr lang="en-US" sz="2600" dirty="0" smtClean="0"/>
+              <a:t>Backend development: automation, tools</a:t>
+            </a:r>
+          </a:p>
+          <a:p>
+            <a:pPr marL="285750" indent="-285750">
+              <a:buFont typeface="Arial" panose="020B0604020202020204" pitchFamily="34" charset="0"/>
+              <a:buChar char="•"/>
+            </a:pPr>
+            <a:r>
+              <a:rPr lang="en-US" sz="2600" dirty="0" smtClean="0"/>
+              <a:t>Mobile app development side projects</a:t>
+            </a:r>
+          </a:p>
+          <a:p>
+            <a:pPr marL="742950" lvl="1" indent="-285750">
+              <a:buFont typeface="Arial" panose="020B0604020202020204" pitchFamily="34" charset="0"/>
+              <a:buChar char="•"/>
+            </a:pPr>
+            <a:r>
+              <a:rPr lang="en-US" sz="2600" dirty="0" smtClean="0"/>
+              <a:t>Switched to front-end </a:t>
+            </a:r>
+            <a:r>
+              <a:rPr lang="en-US" sz="2600" dirty="0" err="1" smtClean="0"/>
+              <a:t>dev</a:t>
+            </a:r>
+            <a:endParaRPr lang="en-US" sz="2600" dirty="0" smtClean="0"/>
+          </a:p>
+          <a:p>
+            <a:pPr marL="285750" indent="-285750">
+              <a:buFont typeface="Arial" panose="020B0604020202020204" pitchFamily="34" charset="0"/>
+              <a:buChar char="•"/>
+            </a:pPr>
+            <a:endParaRPr lang="en-US" sz="2600" dirty="0"/>
+          </a:p>
+        </p:txBody>
+      </p:sp>
+    </p:spTree>
+    <p:extLst>
+      <p:ext uri="{BB962C8B-B14F-4D97-AF65-F5344CB8AC3E}">
+        <p14:creationId xmlns:p14="http://schemas.microsoft.com/office/powerpoint/2010/main" val="1034644854"/>
+      </p:ext>
+    </p:extLst>
+  </p:cSld>
+  <p:clrMapOvr>
+    <a:masterClrMapping/>
+  </p:clrMapOvr>
+  <p:timing>
+    <p:tnLst>
+      <p:par>
+        <p:cTn id="1" dur="indefinite" restart="never" nodeType="tmRoot"/>
+      </p:par>
+    </p:tnLst>
+  </p:timing>
+</p:sld>
+</file>
+
+<file path=ppt/slides/slide3.xml><?xml version="1.0" encoding="utf-8"?>
+<p:sld xmlns:a="http://schemas.openxmlformats.org/drawingml/2006/main" xmlns:r="http://schemas.openxmlformats.org/officeDocument/2006/relationships" xmlns:p="http://schemas.openxmlformats.org/presentationml/2006/main">
+  <p:cSld>
+    <p:spTree>
+      <p:nvGrpSpPr>
+        <p:cNvPr id="1" name=""/>
+        <p:cNvGrpSpPr/>
+        <p:nvPr/>
+      </p:nvGrpSpPr>
+      <p:grpSpPr>
+        <a:xfrm>
+          <a:off x="0" y="0"/>
+          <a:ext cx="0" cy="0"/>
+          <a:chOff x="0" y="0"/>
+          <a:chExt cx="0" cy="0"/>
+        </a:xfrm>
+      </p:grpSpPr>
+      <p:sp>
+        <p:nvSpPr>
+          <p:cNvPr id="3" name="Title 2"/>
+          <p:cNvSpPr>
+            <a:spLocks noGrp="1"/>
+          </p:cNvSpPr>
+          <p:nvPr>
+            <p:ph type="title"/>
+          </p:nvPr>
+        </p:nvSpPr>
+        <p:spPr>
+          <a:xfrm>
+            <a:off x="3733800" y="228600"/>
+            <a:ext cx="1600200" cy="471055"/>
+          </a:xfrm>
+        </p:spPr>
+        <p:txBody>
+          <a:bodyPr/>
+          <a:lstStyle/>
+          <a:p>
+            <a:r>
+              <a:rPr lang="en-US" dirty="0" smtClean="0"/>
+              <a:t>Versions</a:t>
+            </a:r>
+            <a:endParaRPr lang="en-US" dirty="0"/>
+          </a:p>
+        </p:txBody>
+      </p:sp>
+      <p:pic>
+        <p:nvPicPr>
+          <p:cNvPr id="2050" name="Picture 2" descr="https://s4.mzstatic.com/us/r30/Purple/v4/19/a1/11/19a11158-9c6c-bdcb-ae3f-85d89d51a539/mzl.ckfjgpxo.png?downloadKey=1402969696_b1547a092671ba7d7c1ded8edb08406c"/>
+          <p:cNvPicPr>
+            <a:picLocks noChangeAspect="1" noChangeArrowheads="1"/>
+          </p:cNvPicPr>
+          <p:nvPr/>
+        </p:nvPicPr>
+        <p:blipFill>
+          <a:blip r:embed="rId2">
+            <a:extLst>
+              <a:ext uri="{28A0092B-C50C-407E-A947-70E740481C1C}">
+                <a14:useLocalDpi xmlns:a14="http://schemas.microsoft.com/office/drawing/2010/main" val="0"/>
+              </a:ext>
+            </a:extLst>
+          </a:blip>
+          <a:srcRect/>
+          <a:stretch>
+            <a:fillRect/>
+          </a:stretch>
+        </p:blipFill>
+        <p:spPr bwMode="auto">
+          <a:xfrm>
+            <a:off x="3119907" y="1676400"/>
+            <a:ext cx="2747493" cy="4876800"/>
+          </a:xfrm>
+          <a:prstGeom prst="rect">
+            <a:avLst/>
+          </a:prstGeom>
+          <a:noFill/>
+          <a:extLst>
+            <a:ext uri="{909E8E84-426E-40DD-AFC4-6F175D3DCCD1}">
+              <a14:hiddenFill xmlns:a14="http://schemas.microsoft.com/office/drawing/2010/main">
+                <a:solidFill>
+                  <a:srgbClr val="FFFFFF"/>
+                </a:solidFill>
+              </a14:hiddenFill>
+            </a:ext>
+          </a:extLst>
+        </p:spPr>
+      </p:pic>
+      <p:pic>
+        <p:nvPicPr>
+          <p:cNvPr id="2052" name="Picture 4" descr="1 of 4"/>
+          <p:cNvPicPr>
+            <a:picLocks noChangeAspect="1" noChangeArrowheads="1"/>
+          </p:cNvPicPr>
+          <p:nvPr/>
+        </p:nvPicPr>
+        <p:blipFill>
+          <a:blip r:embed="rId3">
+            <a:extLst>
+              <a:ext uri="{28A0092B-C50C-407E-A947-70E740481C1C}">
+                <a14:useLocalDpi xmlns:a14="http://schemas.microsoft.com/office/drawing/2010/main" val="0"/>
+              </a:ext>
+            </a:extLst>
+          </a:blip>
+          <a:srcRect/>
+          <a:stretch>
+            <a:fillRect/>
+          </a:stretch>
+        </p:blipFill>
+        <p:spPr bwMode="auto">
+          <a:xfrm>
+            <a:off x="6096000" y="1676400"/>
+            <a:ext cx="2927860" cy="4876800"/>
+          </a:xfrm>
+          <a:prstGeom prst="rect">
+            <a:avLst/>
+          </a:prstGeom>
+          <a:noFill/>
+          <a:extLst>
+            <a:ext uri="{909E8E84-426E-40DD-AFC4-6F175D3DCCD1}">
+              <a14:hiddenFill xmlns:a14="http://schemas.microsoft.com/office/drawing/2010/main">
+                <a:solidFill>
+                  <a:srgbClr val="FFFFFF"/>
+                </a:solidFill>
+              </a14:hiddenFill>
+            </a:ext>
+          </a:extLst>
+        </p:spPr>
+      </p:pic>
+      <p:sp>
+        <p:nvSpPr>
+          <p:cNvPr id="4" name="AutoShape 6" descr="Fitwatchr for Fitbit - screenshot"/>
+          <p:cNvSpPr>
+            <a:spLocks noChangeAspect="1" noChangeArrowheads="1"/>
+          </p:cNvSpPr>
+          <p:nvPr/>
+        </p:nvSpPr>
+        <p:spPr bwMode="auto">
+          <a:xfrm>
+            <a:off x="155575" y="-144463"/>
+            <a:ext cx="304800" cy="304801"/>
+          </a:xfrm>
+          <a:prstGeom prst="rect">
+            <a:avLst/>
+          </a:prstGeom>
+          <a:noFill/>
+          <a:extLst>
+            <a:ext uri="{909E8E84-426E-40DD-AFC4-6F175D3DCCD1}">
+              <a14:hiddenFill xmlns:a14="http://schemas.microsoft.com/office/drawing/2010/main">
+                <a:solidFill>
+                  <a:srgbClr val="FFFFFF"/>
+                </a:solidFill>
+              </a14:hiddenFill>
+            </a:ext>
+          </a:extLst>
+        </p:spPr>
+        <p:txBody>
+          <a:bodyPr vert="horz" wrap="square" lIns="91440" tIns="45720" rIns="91440" bIns="45720" numCol="1" anchor="t" anchorCtr="0" compatLnSpc="1">
+            <a:prstTxWarp prst="textNoShape">
+              <a:avLst/>
+            </a:prstTxWarp>
+          </a:bodyPr>
           <a:lstStyle/>
           <a:p>
             <a:endParaRPr lang="en-US"/>
@@ -3465,20 +3827,163 @@
       </p:sp>
       <p:sp>
         <p:nvSpPr>
-          <p:cNvPr id="3" name="Title 2"/>
-          <p:cNvSpPr>
-            <a:spLocks noGrp="1"/>
-          </p:cNvSpPr>
-          <p:nvPr>
-            <p:ph type="title"/>
-          </p:nvPr>
-        </p:nvSpPr>
-        <p:spPr/>
-        <p:txBody>
-          <a:bodyPr/>
+          <p:cNvPr id="5" name="AutoShape 8" descr="Fitwatchr for Fitbit - screenshot"/>
+          <p:cNvSpPr>
+            <a:spLocks noChangeAspect="1" noChangeArrowheads="1"/>
+          </p:cNvSpPr>
+          <p:nvPr/>
+        </p:nvSpPr>
+        <p:spPr bwMode="auto">
+          <a:xfrm>
+            <a:off x="307975" y="7937"/>
+            <a:ext cx="304800" cy="304801"/>
+          </a:xfrm>
+          <a:prstGeom prst="rect">
+            <a:avLst/>
+          </a:prstGeom>
+          <a:noFill/>
+          <a:extLst>
+            <a:ext uri="{909E8E84-426E-40DD-AFC4-6F175D3DCCD1}">
+              <a14:hiddenFill xmlns:a14="http://schemas.microsoft.com/office/drawing/2010/main">
+                <a:solidFill>
+                  <a:srgbClr val="FFFFFF"/>
+                </a:solidFill>
+              </a14:hiddenFill>
+            </a:ext>
+          </a:extLst>
+        </p:spPr>
+        <p:txBody>
+          <a:bodyPr vert="horz" wrap="square" lIns="91440" tIns="45720" rIns="91440" bIns="45720" numCol="1" anchor="t" anchorCtr="0" compatLnSpc="1">
+            <a:prstTxWarp prst="textNoShape">
+              <a:avLst/>
+            </a:prstTxWarp>
+          </a:bodyPr>
           <a:lstStyle/>
           <a:p>
             <a:endParaRPr lang="en-US"/>
+          </a:p>
+        </p:txBody>
+      </p:sp>
+      <p:sp>
+        <p:nvSpPr>
+          <p:cNvPr id="6" name="AutoShape 10" descr="Fitwatchr for Fitbit - screenshot"/>
+          <p:cNvSpPr>
+            <a:spLocks noChangeAspect="1" noChangeArrowheads="1"/>
+          </p:cNvSpPr>
+          <p:nvPr/>
+        </p:nvSpPr>
+        <p:spPr bwMode="auto">
+          <a:xfrm>
+            <a:off x="460375" y="160337"/>
+            <a:ext cx="304800" cy="304801"/>
+          </a:xfrm>
+          <a:prstGeom prst="rect">
+            <a:avLst/>
+          </a:prstGeom>
+          <a:noFill/>
+          <a:extLst>
+            <a:ext uri="{909E8E84-426E-40DD-AFC4-6F175D3DCCD1}">
+              <a14:hiddenFill xmlns:a14="http://schemas.microsoft.com/office/drawing/2010/main">
+                <a:solidFill>
+                  <a:srgbClr val="FFFFFF"/>
+                </a:solidFill>
+              </a14:hiddenFill>
+            </a:ext>
+          </a:extLst>
+        </p:spPr>
+        <p:txBody>
+          <a:bodyPr vert="horz" wrap="square" lIns="91440" tIns="45720" rIns="91440" bIns="45720" numCol="1" anchor="t" anchorCtr="0" compatLnSpc="1">
+            <a:prstTxWarp prst="textNoShape">
+              <a:avLst/>
+            </a:prstTxWarp>
+          </a:bodyPr>
+          <a:lstStyle/>
+          <a:p>
+            <a:endParaRPr lang="en-US"/>
+          </a:p>
+        </p:txBody>
+      </p:sp>
+      <p:pic>
+        <p:nvPicPr>
+          <p:cNvPr id="2059" name="Picture 11"/>
+          <p:cNvPicPr>
+            <a:picLocks noChangeAspect="1" noChangeArrowheads="1"/>
+          </p:cNvPicPr>
+          <p:nvPr/>
+        </p:nvPicPr>
+        <p:blipFill>
+          <a:blip r:embed="rId4">
+            <a:extLst>
+              <a:ext uri="{28A0092B-C50C-407E-A947-70E740481C1C}">
+                <a14:useLocalDpi xmlns:a14="http://schemas.microsoft.com/office/drawing/2010/main" val="0"/>
+              </a:ext>
+            </a:extLst>
+          </a:blip>
+          <a:srcRect/>
+          <a:stretch>
+            <a:fillRect/>
+          </a:stretch>
+        </p:blipFill>
+        <p:spPr bwMode="auto">
+          <a:xfrm>
+            <a:off x="207500" y="1676400"/>
+            <a:ext cx="2688100" cy="4836688"/>
+          </a:xfrm>
+          <a:prstGeom prst="rect">
+            <a:avLst/>
+          </a:prstGeom>
+          <a:noFill/>
+          <a:ln>
+            <a:noFill/>
+          </a:ln>
+          <a:extLst>
+            <a:ext uri="{909E8E84-426E-40DD-AFC4-6F175D3DCCD1}">
+              <a14:hiddenFill xmlns:a14="http://schemas.microsoft.com/office/drawing/2010/main">
+                <a:solidFill>
+                  <a:schemeClr val="accent1"/>
+                </a:solidFill>
+              </a14:hiddenFill>
+            </a:ext>
+            <a:ext uri="{91240B29-F687-4F45-9708-019B960494DF}">
+              <a14:hiddenLine xmlns:a14="http://schemas.microsoft.com/office/drawing/2010/main" w="9525">
+                <a:solidFill>
+                  <a:schemeClr val="tx1"/>
+                </a:solidFill>
+                <a:miter lim="800000"/>
+                <a:headEnd/>
+                <a:tailEnd/>
+              </a14:hiddenLine>
+            </a:ext>
+          </a:extLst>
+        </p:spPr>
+      </p:pic>
+      <p:sp>
+        <p:nvSpPr>
+          <p:cNvPr id="7" name="TextBox 6"/>
+          <p:cNvSpPr txBox="1"/>
+          <p:nvPr/>
+        </p:nvSpPr>
+        <p:spPr>
+          <a:xfrm>
+            <a:off x="381000" y="1078468"/>
+            <a:ext cx="8455025" cy="369332"/>
+          </a:xfrm>
+          <a:prstGeom prst="rect">
+            <a:avLst/>
+          </a:prstGeom>
+          <a:noFill/>
+        </p:spPr>
+        <p:txBody>
+          <a:bodyPr wrap="square" rtlCol="0">
+            <a:spAutoFit/>
+          </a:bodyPr>
+          <a:lstStyle/>
+          <a:p>
+            <a:r>
+              <a:rPr lang="en-US" dirty="0" smtClean="0"/>
+              <a:t>            Android			iPhone			Windows Phone</a:t>
+            </a:r>
+            <a:endParaRPr lang="en-US" dirty="0"/>
           </a:p>
         </p:txBody>
       </p:sp>
@@ -3492,6 +3997,88 @@
   <p:clrMapOvr>
     <a:masterClrMapping/>
   </p:clrMapOvr>
+  <p:timing>
+    <p:tnLst>
+      <p:par>
+        <p:cTn id="1" dur="indefinite" restart="never" nodeType="tmRoot"/>
+      </p:par>
+    </p:tnLst>
+  </p:timing>
+</p:sld>
+</file>
+
+<file path=ppt/slides/slide4.xml><?xml version="1.0" encoding="utf-8"?>
+<p:sld xmlns:a="http://schemas.openxmlformats.org/drawingml/2006/main" xmlns:r="http://schemas.openxmlformats.org/officeDocument/2006/relationships" xmlns:p="http://schemas.openxmlformats.org/presentationml/2006/main">
+  <p:cSld>
+    <p:spTree>
+      <p:nvGrpSpPr>
+        <p:cNvPr id="1" name=""/>
+        <p:cNvGrpSpPr/>
+        <p:nvPr/>
+      </p:nvGrpSpPr>
+      <p:grpSpPr>
+        <a:xfrm>
+          <a:off x="0" y="0"/>
+          <a:ext cx="0" cy="0"/>
+          <a:chOff x="0" y="0"/>
+          <a:chExt cx="0" cy="0"/>
+        </a:xfrm>
+      </p:grpSpPr>
+      <p:sp>
+        <p:nvSpPr>
+          <p:cNvPr id="2" name="Content Placeholder 1"/>
+          <p:cNvSpPr>
+            <a:spLocks noGrp="1"/>
+          </p:cNvSpPr>
+          <p:nvPr>
+            <p:ph sz="quarter" idx="13"/>
+          </p:nvPr>
+        </p:nvSpPr>
+        <p:spPr/>
+        <p:txBody>
+          <a:bodyPr/>
+          <a:lstStyle/>
+          <a:p>
+            <a:endParaRPr lang="en-US"/>
+          </a:p>
+        </p:txBody>
+      </p:sp>
+      <p:sp>
+        <p:nvSpPr>
+          <p:cNvPr id="3" name="Title 2"/>
+          <p:cNvSpPr>
+            <a:spLocks noGrp="1"/>
+          </p:cNvSpPr>
+          <p:nvPr>
+            <p:ph type="title"/>
+          </p:nvPr>
+        </p:nvSpPr>
+        <p:spPr/>
+        <p:txBody>
+          <a:bodyPr/>
+          <a:lstStyle/>
+          <a:p>
+            <a:endParaRPr lang="en-US"/>
+          </a:p>
+        </p:txBody>
+      </p:sp>
+    </p:spTree>
+    <p:extLst>
+      <p:ext uri="{BB962C8B-B14F-4D97-AF65-F5344CB8AC3E}">
+        <p14:creationId xmlns:p14="http://schemas.microsoft.com/office/powerpoint/2010/main" val="2042000057"/>
+      </p:ext>
+    </p:extLst>
+  </p:cSld>
+  <p:clrMapOvr>
+    <a:masterClrMapping/>
+  </p:clrMapOvr>
+  <p:timing>
+    <p:tnLst>
+      <p:par>
+        <p:cTn id="1" dur="indefinite" restart="never" nodeType="tmRoot"/>
+      </p:par>
+    </p:tnLst>
+  </p:timing>
 </p:sld>
 </file>
 

</xml_diff>